<commit_message>
changed the slide in there where you get the data set
</commit_message>
<xml_diff>
--- a/Fall2018 Lecture Notes/Chapter 2 Lecture.pptx
+++ b/Fall2018 Lecture Notes/Chapter 2 Lecture.pptx
@@ -4929,11 +4929,13 @@
         </p:nvSpPr>
         <p:spPr/>
         <p:txBody>
-          <a:bodyPr/>
-          <a:lstStyle/>
-          <a:p>
-            <a:r>
-              <a:rPr lang="en-US" dirty="0"/>
+          <a:bodyPr>
+            <a:normAutofit/>
+          </a:bodyPr>
+          <a:lstStyle/>
+          <a:p>
+            <a:r>
+              <a:rPr lang="en-US" sz="7200" dirty="0"/>
               <a:t>Frequency Distributions</a:t>
             </a:r>
           </a:p>
@@ -7079,7 +7081,12 @@
             <p:ph idx="1"/>
           </p:nvPr>
         </p:nvSpPr>
-        <p:spPr/>
+        <p:spPr>
+          <a:xfrm>
+            <a:off x="822959" y="1845734"/>
+            <a:ext cx="7635241" cy="4023360"/>
+          </a:xfrm>
+        </p:spPr>
         <p:txBody>
           <a:bodyPr/>
           <a:lstStyle/>
@@ -7092,41 +7099,53 @@
               <a:rPr lang="en-US" dirty="0" err="1"/>
               <a:t>JASP</a:t>
             </a:r>
-            <a:endParaRPr lang="en-US" dirty="0"/>
-          </a:p>
-          <a:p>
             <a:r>
               <a:rPr lang="en-US" dirty="0"/>
-              <a:t>Open your data set</a:t>
-            </a:r>
-          </a:p>
-          <a:p>
+              <a:t> </a:t>
+            </a:r>
+            <a:r>
+              <a:rPr lang="en-US" dirty="0">
+                <a:sym typeface="Wingdings" panose="05000000000000000000" pitchFamily="2" charset="2"/>
+              </a:rPr>
+              <a:t> </a:t>
+            </a:r>
+            <a:r>
+              <a:rPr lang="en-US" dirty="0"/>
+              <a:t>Open your data set (Data Library </a:t>
+            </a:r>
+            <a:r>
+              <a:rPr lang="en-US" dirty="0">
+                <a:sym typeface="Wingdings" panose="05000000000000000000" pitchFamily="2" charset="2"/>
+              </a:rPr>
+              <a:t> Regression  Big Five)</a:t>
+            </a:r>
             <a:endParaRPr lang="en-US" dirty="0"/>
           </a:p>
         </p:txBody>
       </p:sp>
       <p:pic>
         <p:nvPicPr>
-          <p:cNvPr id="4" name="Picture 3">
+          <p:cNvPr id="5" name="Picture 4">
             <a:extLst>
               <a:ext uri="{FF2B5EF4-FFF2-40B4-BE49-F238E27FC236}">
-                <a16:creationId xmlns:a16="http://schemas.microsoft.com/office/drawing/2014/main" id="{A28A4A84-60BD-405A-84F1-063315885D06}"/>
+                <a16:creationId xmlns:a16="http://schemas.microsoft.com/office/drawing/2014/main" id="{A24B4DDD-4EA6-412A-930B-FAA94A21CF79}"/>
               </a:ext>
             </a:extLst>
           </p:cNvPr>
-          <p:cNvPicPr/>
+          <p:cNvPicPr>
+            <a:picLocks noChangeAspect="1"/>
+          </p:cNvPicPr>
           <p:nvPr/>
         </p:nvPicPr>
-        <p:blipFill>
+        <p:blipFill rotWithShape="1">
           <a:blip r:embed="rId2"/>
-          <a:stretch>
-            <a:fillRect/>
-          </a:stretch>
+          <a:srcRect l="-1" t="1123" r="1" b="21713"/>
+          <a:stretch/>
         </p:blipFill>
         <p:spPr>
           <a:xfrm>
-            <a:off x="1600200" y="3048000"/>
-            <a:ext cx="5943600" cy="2210435"/>
+            <a:off x="1165860" y="2385606"/>
+            <a:ext cx="6858000" cy="3572811"/>
           </a:xfrm>
           <a:prstGeom prst="rect">
             <a:avLst/>

</xml_diff>